<commit_message>
task(5): updated slides for task 5 #57
</commit_message>
<xml_diff>
--- a/tasks/task5/task5_presentation.pptx
+++ b/tasks/task5/task5_presentation.pptx
@@ -6968,7 +6968,7 @@
           <a:p>
             <a:fld id="{842CE5A1-857B-214D-8BEE-AF65CEFCD544}" type="datetimeFigureOut">
               <a:rPr lang="de-DE" smtClean="0"/>
-              <a:t>30.04.2022</a:t>
+              <a:t>01.05.2022</a:t>
             </a:fld>
             <a:endParaRPr lang="de-DE"/>
           </a:p>
@@ -9678,10 +9678,10 @@
       </p:sp>
       <p:pic>
         <p:nvPicPr>
-          <p:cNvPr id="22" name="Grafik 21" descr="Ein Bild, das Text enthält.&#10;&#10;Automatisch generierte Beschreibung">
+          <p:cNvPr id="6" name="Grafik 5" descr="Ein Bild, das Text enthält.&#10;&#10;Automatisch generierte Beschreibung">
             <a:extLst>
               <a:ext uri="{FF2B5EF4-FFF2-40B4-BE49-F238E27FC236}">
-                <a16:creationId xmlns:a16="http://schemas.microsoft.com/office/drawing/2014/main" id="{EC98D89A-4B5F-F1AC-462D-6C4FBE45FBD6}"/>
+                <a16:creationId xmlns:a16="http://schemas.microsoft.com/office/drawing/2014/main" id="{142EE9EF-686F-B000-3541-5AD9DDD8920C}"/>
               </a:ext>
             </a:extLst>
           </p:cNvPr>
@@ -9698,8 +9698,8 @@
         </p:blipFill>
         <p:spPr>
           <a:xfrm>
-            <a:off x="6456040" y="908233"/>
-            <a:ext cx="5735960" cy="4293279"/>
+            <a:off x="6744072" y="1549375"/>
+            <a:ext cx="5230529" cy="2996952"/>
           </a:xfrm>
           <a:prstGeom prst="rect">
             <a:avLst/>
@@ -10422,7 +10422,7 @@
                   <a:schemeClr val="tx1"/>
                 </a:solidFill>
               </a:rPr>
-              <a:t>There is no plan operators interface</a:t>
+              <a:t>There is no explicit plan operators interface</a:t>
             </a:r>
           </a:p>
           <a:p>
@@ -10932,10 +10932,10 @@
       </p:sp>
       <p:pic>
         <p:nvPicPr>
-          <p:cNvPr id="18" name="Grafik 17" descr="Ein Bild, das Text enthält.&#10;&#10;Automatisch generierte Beschreibung">
+          <p:cNvPr id="3" name="Grafik 2" descr="Ein Bild, das Text enthält.&#10;&#10;Automatisch generierte Beschreibung">
             <a:extLst>
               <a:ext uri="{FF2B5EF4-FFF2-40B4-BE49-F238E27FC236}">
-                <a16:creationId xmlns:a16="http://schemas.microsoft.com/office/drawing/2014/main" id="{445919F3-CE64-3518-B60A-40F66F79DCC8}"/>
+                <a16:creationId xmlns:a16="http://schemas.microsoft.com/office/drawing/2014/main" id="{6490B65A-837B-1297-4434-A600FFD14F63}"/>
               </a:ext>
             </a:extLst>
           </p:cNvPr>
@@ -10952,8 +10952,8 @@
         </p:blipFill>
         <p:spPr>
           <a:xfrm>
-            <a:off x="623392" y="1052736"/>
-            <a:ext cx="8963025" cy="4638675"/>
+            <a:off x="807370" y="1556792"/>
+            <a:ext cx="8745014" cy="3251087"/>
           </a:xfrm>
           <a:prstGeom prst="rect">
             <a:avLst/>

</xml_diff>